<commit_message>
Update presentation with current employment information
</commit_message>
<xml_diff>
--- a/comm-and-doc-arch-decisions-30-min.pptx
+++ b/comm-and-doc-arch-decisions-30-min.pptx
@@ -933,7 +933,7 @@
           <a:p>
             <a:fld id="{6525C509-FCE7-1E4E-BABF-F948CC4246E2}" type="datetimeFigureOut">
               <a:rPr lang="en-US" smtClean="0"/>
-              <a:t>4/9/2019</a:t>
+              <a:t>4/17/22</a:t>
             </a:fld>
             <a:endParaRPr lang="en-US"/>
           </a:p>
@@ -1436,18 +1436,6 @@
           <a:p>
             <a:pPr rtl="0" fontAlgn="base"/>
             <a:r>
-              <a:rPr lang="en-US" sz="1200" b="0" i="0" u="none" strike="noStrike" kern="1200" dirty="0" smtClean="0">
-                <a:solidFill>
-                  <a:schemeClr val="tx1"/>
-                </a:solidFill>
-                <a:effectLst/>
-                <a:latin typeface="+mn-lt"/>
-                <a:ea typeface="+mn-ea"/>
-                <a:cs typeface="+mn-cs"/>
-              </a:rPr>
-              <a:t>And we're </a:t>
-            </a:r>
-            <a:r>
               <a:rPr lang="en-US" sz="1200" b="0" i="0" u="none" strike="noStrike" kern="1200" dirty="0">
                 <a:solidFill>
                   <a:schemeClr val="tx1"/>
@@ -1457,7 +1445,7 @@
                 <a:ea typeface="+mn-ea"/>
                 <a:cs typeface="+mn-cs"/>
               </a:rPr>
-              <a:t>not good at recording the decisions, and more importantly, the *context* behind the decisions, in a way that our future selves (or anyone -- someone just joining the team, for example) can look back and understand *why* the decision was made and what the factors that went into the decision were. Most of these decisions are well thought out and carefully considered, taking in all the pros and cons of a given situation, but usually that context is lost forever.</a:t>
+              <a:t>And we're not good at recording the decisions, and more importantly, the *context* behind the decisions, in a way that our future selves (or anyone -- someone just joining the team, for example) can look back and understand *why* the decision was made and what the factors that went into the decision were. Most of these decisions are well thought out and carefully considered, taking in all the pros and cons of a given situation, but usually that context is lost forever.</a:t>
             </a:r>
           </a:p>
         </p:txBody>
@@ -2042,12 +2030,6 @@
           </a:p>
           <a:p>
             <a:pPr rtl="0"/>
-            <a:r>
-              <a:rPr lang="en-US" b="0" dirty="0">
-                <a:effectLst/>
-              </a:rPr>
-              <a:t/>
-            </a:r>
             <a:br>
               <a:rPr lang="en-US" b="0" dirty="0">
                 <a:effectLst/>
@@ -2775,10 +2757,6 @@
             </a:endParaRPr>
           </a:p>
           <a:p>
-            <a:r>
-              <a:rPr lang="en-US" dirty="0"/>
-              <a:t/>
-            </a:r>
             <a:br>
               <a:rPr lang="en-US" dirty="0"/>
             </a:br>
@@ -2873,10 +2851,6 @@
           <a:bodyPr/>
           <a:lstStyle/>
           <a:p>
-            <a:r>
-              <a:rPr lang="en-US" dirty="0"/>
-              <a:t/>
-            </a:r>
             <a:br>
               <a:rPr lang="en-US" dirty="0"/>
             </a:br>
@@ -3761,23 +3735,11 @@
                 <a:ea typeface="+mn-ea"/>
                 <a:cs typeface="+mn-cs"/>
               </a:rPr>
-              <a:t>We do live in interesting times. Technology is changing at an ever increasing pace, and </a:t>
-            </a:r>
-            <a:r>
-              <a:rPr lang="en-US" sz="1800" b="0" i="0" u="none" strike="noStrike" kern="1200" dirty="0" smtClean="0">
-                <a:solidFill>
-                  <a:schemeClr val="tx1"/>
-                </a:solidFill>
-                <a:effectLst/>
-                <a:latin typeface="+mn-lt"/>
-                <a:ea typeface="+mn-ea"/>
-                <a:cs typeface="+mn-cs"/>
-              </a:rPr>
-              <a:t>we’re all learning new ways of doing things. </a:t>
-            </a:r>
-          </a:p>
-          <a:p>
-            <a:endParaRPr lang="en-US" sz="1800" b="0" i="0" u="none" strike="noStrike" kern="1200" dirty="0" smtClean="0">
+              <a:t>We do live in interesting times. Technology is changing at an ever increasing pace, and we’re all learning new ways of doing things. </a:t>
+            </a:r>
+          </a:p>
+          <a:p>
+            <a:endParaRPr lang="en-US" sz="1800" b="0" i="0" u="none" strike="noStrike" kern="1200" dirty="0">
               <a:solidFill>
                 <a:schemeClr val="tx1"/>
               </a:solidFill>
@@ -3789,7 +3751,7 @@
           </a:p>
           <a:p>
             <a:r>
-              <a:rPr lang="en-US" sz="1800" b="0" i="0" u="none" strike="noStrike" kern="1200" dirty="0" smtClean="0">
+              <a:rPr lang="en-US" sz="1800" b="0" i="0" u="none" strike="noStrike" kern="1200" dirty="0">
                 <a:solidFill>
                   <a:schemeClr val="tx1"/>
                 </a:solidFill>
@@ -3801,7 +3763,7 @@
               <a:t>Agile practitioners advocate deferring decisions until the least responsible moment</a:t>
             </a:r>
             <a:r>
-              <a:rPr lang="en-US" sz="1800" b="0" i="0" u="none" strike="noStrike" kern="1200" baseline="0" dirty="0" smtClean="0">
+              <a:rPr lang="en-US" sz="1800" b="0" i="0" u="none" strike="noStrike" kern="1200" baseline="0" dirty="0">
                 <a:solidFill>
                   <a:schemeClr val="tx1"/>
                 </a:solidFill>
@@ -3813,7 +3775,7 @@
               <a:t> and using </a:t>
             </a:r>
             <a:r>
-              <a:rPr lang="en-US" sz="1800" b="0" i="0" u="none" strike="noStrike" kern="1200" dirty="0" smtClean="0">
+              <a:rPr lang="en-US" sz="1800" b="0" i="0" u="none" strike="noStrike" kern="1200" dirty="0">
                 <a:solidFill>
                   <a:schemeClr val="tx1"/>
                 </a:solidFill>
@@ -3825,7 +3787,7 @@
               <a:t>evolutionary</a:t>
             </a:r>
             <a:r>
-              <a:rPr lang="en-US" sz="1800" b="0" i="0" u="none" strike="noStrike" kern="1200" baseline="0" dirty="0" smtClean="0">
+              <a:rPr lang="en-US" sz="1800" b="0" i="0" u="none" strike="noStrike" kern="1200" baseline="0" dirty="0">
                 <a:solidFill>
                   <a:schemeClr val="tx1"/>
                 </a:solidFill>
@@ -4286,12 +4248,6 @@
           </a:p>
           <a:p>
             <a:pPr rtl="0"/>
-            <a:r>
-              <a:rPr lang="en-US" b="0" dirty="0">
-                <a:effectLst/>
-              </a:rPr>
-              <a:t/>
-            </a:r>
             <a:br>
               <a:rPr lang="en-US" b="0" dirty="0">
                 <a:effectLst/>
@@ -4338,10 +4294,6 @@
             </a:endParaRPr>
           </a:p>
           <a:p>
-            <a:r>
-              <a:rPr lang="en-US" dirty="0"/>
-              <a:t/>
-            </a:r>
             <a:br>
               <a:rPr lang="en-US" dirty="0"/>
             </a:br>
@@ -4508,10 +4460,6 @@
             </a:endParaRPr>
           </a:p>
           <a:p>
-            <a:r>
-              <a:rPr lang="en-US" dirty="0"/>
-              <a:t/>
-            </a:r>
             <a:br>
               <a:rPr lang="en-US" dirty="0"/>
             </a:br>
@@ -5231,13 +5179,13 @@
           <a:p>
             <a:pPr rtl="0"/>
             <a:r>
-              <a:rPr lang="en-US" b="0" dirty="0" smtClean="0">
+              <a:rPr lang="en-US" b="0" dirty="0">
                 <a:effectLst/>
               </a:rPr>
               <a:t>As technology leaders, we are responsible for maintaining the health,</a:t>
             </a:r>
             <a:r>
-              <a:rPr lang="en-US" b="0" baseline="0" dirty="0" smtClean="0">
+              <a:rPr lang="en-US" b="0" baseline="0" dirty="0">
                 <a:effectLst/>
               </a:rPr>
               <a:t> welfare, and safety of the teams that work with us and the enterprise systems in general. </a:t>
@@ -5245,14 +5193,14 @@
           </a:p>
           <a:p>
             <a:pPr rtl="0"/>
-            <a:endParaRPr lang="en-US" b="0" baseline="0" dirty="0" smtClean="0">
+            <a:endParaRPr lang="en-US" b="0" baseline="0" dirty="0">
               <a:effectLst/>
             </a:endParaRPr>
           </a:p>
           <a:p>
             <a:pPr rtl="0"/>
             <a:r>
-              <a:rPr lang="en-US" b="0" baseline="0" dirty="0" smtClean="0">
+              <a:rPr lang="en-US" b="0" baseline="0" dirty="0">
                 <a:effectLst/>
               </a:rPr>
               <a:t>With decentralized decision making happing all around us, how to we provide some guard rails and a safety net to protect our teams (and our systems) from the dangers that are lurking out there. Because, make no mistake, they are lurking.</a:t>
@@ -5952,12 +5900,6 @@
           </a:p>
           <a:p>
             <a:pPr rtl="0"/>
-            <a:r>
-              <a:rPr lang="en-US" b="0" dirty="0">
-                <a:effectLst/>
-              </a:rPr>
-              <a:t/>
-            </a:r>
             <a:br>
               <a:rPr lang="en-US" b="0" dirty="0">
                 <a:effectLst/>
@@ -6475,7 +6417,7 @@
           <a:p>
             <a:pPr rtl="0"/>
             <a:r>
-              <a:rPr lang="en-US" b="0" dirty="0" smtClean="0">
+              <a:rPr lang="en-US" b="0" dirty="0">
                 <a:effectLst/>
               </a:rPr>
               <a:t>A quick example to illustrate the problem:</a:t>
@@ -6483,14 +6425,14 @@
           </a:p>
           <a:p>
             <a:pPr rtl="0"/>
-            <a:endParaRPr lang="en-US" b="0" baseline="0" dirty="0" smtClean="0">
+            <a:endParaRPr lang="en-US" b="0" baseline="0" dirty="0">
               <a:effectLst/>
             </a:endParaRPr>
           </a:p>
           <a:p>
             <a:pPr rtl="0"/>
             <a:r>
-              <a:rPr lang="en-US" b="0" baseline="0" dirty="0" smtClean="0">
+              <a:rPr lang="en-US" b="0" baseline="0" dirty="0">
                 <a:effectLst/>
               </a:rPr>
               <a:t>We had a team that decided that the best database to use was MongoDB. They talked to a guy on the ops side, who was super accommodating and set up something. They proceeded to build an application (with a tight deadline and large financial impact if we didn’t hit the deadline), and it worked great.</a:t>
@@ -6498,14 +6440,14 @@
           </a:p>
           <a:p>
             <a:pPr rtl="0"/>
-            <a:endParaRPr lang="en-US" b="0" baseline="0" dirty="0" smtClean="0">
+            <a:endParaRPr lang="en-US" b="0" baseline="0" dirty="0">
               <a:effectLst/>
             </a:endParaRPr>
           </a:p>
           <a:p>
             <a:pPr rtl="0"/>
             <a:r>
-              <a:rPr lang="en-US" b="0" baseline="0" dirty="0" smtClean="0">
+              <a:rPr lang="en-US" b="0" baseline="0" dirty="0">
                 <a:effectLst/>
               </a:rPr>
               <a:t>But when it was time to go into production, they hadn’t worked out all of the details with the ops team. They hadn’t socialized their decision properly, nor had they had any sort of “oversight” on their decision to use Mongo.</a:t>
@@ -6513,14 +6455,14 @@
           </a:p>
           <a:p>
             <a:pPr rtl="0"/>
-            <a:endParaRPr lang="en-US" b="0" baseline="0" dirty="0" smtClean="0">
+            <a:endParaRPr lang="en-US" b="0" baseline="0" dirty="0">
               <a:effectLst/>
             </a:endParaRPr>
           </a:p>
           <a:p>
             <a:pPr rtl="0"/>
             <a:r>
-              <a:rPr lang="en-US" b="0" baseline="0" dirty="0" smtClean="0">
+              <a:rPr lang="en-US" b="0" baseline="0" dirty="0">
                 <a:effectLst/>
               </a:rPr>
               <a:t>None of what they did was objectively wrong, but it surfaced a problem: How should we go about avoid stuff like this in the future? What techniques can we use to mitigate issues like this, while at the same time providing flexibility to the teams that are building things?</a:t>
@@ -6977,12 +6919,6 @@
           </a:p>
           <a:p>
             <a:pPr rtl="0"/>
-            <a:r>
-              <a:rPr lang="en-US" b="0" dirty="0">
-                <a:effectLst/>
-              </a:rPr>
-              <a:t/>
-            </a:r>
             <a:br>
               <a:rPr lang="en-US" b="0" dirty="0">
                 <a:effectLst/>
@@ -7746,7 +7682,7 @@
           <a:lstStyle/>
           <a:p>
             <a:r>
-              <a:rPr lang="en-US" sz="1200" b="0" i="0" u="none" strike="noStrike" kern="1200" dirty="0" smtClean="0">
+              <a:rPr lang="en-US" sz="1200" b="0" i="0" u="none" strike="noStrike" kern="1200" dirty="0">
                 <a:solidFill>
                   <a:schemeClr val="tx1"/>
                 </a:solidFill>
@@ -7758,7 +7694,7 @@
               <a:t>Over time, we settled on several techniques</a:t>
             </a:r>
             <a:r>
-              <a:rPr lang="en-US" sz="1200" b="0" i="0" u="none" strike="noStrike" kern="1200" baseline="0" dirty="0" smtClean="0">
+              <a:rPr lang="en-US" sz="1200" b="0" i="0" u="none" strike="noStrike" kern="1200" baseline="0" dirty="0">
                 <a:solidFill>
                   <a:schemeClr val="tx1"/>
                 </a:solidFill>
@@ -8488,12 +8424,6 @@
           </a:p>
           <a:p>
             <a:pPr rtl="0"/>
-            <a:r>
-              <a:rPr lang="en-US" b="0" dirty="0">
-                <a:effectLst/>
-              </a:rPr>
-              <a:t/>
-            </a:r>
             <a:br>
               <a:rPr lang="en-US" b="0" dirty="0">
                 <a:effectLst/>
@@ -8517,12 +8447,6 @@
           </a:p>
           <a:p>
             <a:pPr rtl="0"/>
-            <a:r>
-              <a:rPr lang="en-US" b="0" dirty="0">
-                <a:effectLst/>
-              </a:rPr>
-              <a:t/>
-            </a:r>
             <a:br>
               <a:rPr lang="en-US" b="0" dirty="0">
                 <a:effectLst/>
@@ -8806,7 +8730,7 @@
           <a:p>
             <a:pPr rtl="0"/>
             <a:r>
-              <a:rPr lang="en-US" sz="1800" b="0" i="0" u="none" strike="noStrike" kern="1200" dirty="0" smtClean="0">
+              <a:rPr lang="en-US" sz="1800" b="0" i="0" u="none" strike="noStrike" kern="1200" dirty="0">
                 <a:solidFill>
                   <a:schemeClr val="tx1"/>
                 </a:solidFill>
@@ -9110,7 +9034,7 @@
           <a:p>
             <a:fld id="{F35D5A91-02EC-B04A-8A79-709009E61D04}" type="datetimeFigureOut">
               <a:rPr lang="en-US" smtClean="0"/>
-              <a:t>4/9/2019</a:t>
+              <a:t>4/17/22</a:t>
             </a:fld>
             <a:endParaRPr lang="en-US"/>
           </a:p>
@@ -9308,7 +9232,7 @@
           <a:p>
             <a:fld id="{F35D5A91-02EC-B04A-8A79-709009E61D04}" type="datetimeFigureOut">
               <a:rPr lang="en-US" smtClean="0"/>
-              <a:t>4/9/2019</a:t>
+              <a:t>4/17/22</a:t>
             </a:fld>
             <a:endParaRPr lang="en-US"/>
           </a:p>
@@ -9516,7 +9440,7 @@
           <a:p>
             <a:fld id="{F35D5A91-02EC-B04A-8A79-709009E61D04}" type="datetimeFigureOut">
               <a:rPr lang="en-US" smtClean="0"/>
-              <a:t>4/9/2019</a:t>
+              <a:t>4/17/22</a:t>
             </a:fld>
             <a:endParaRPr lang="en-US"/>
           </a:p>
@@ -9714,7 +9638,7 @@
           <a:p>
             <a:fld id="{F35D5A91-02EC-B04A-8A79-709009E61D04}" type="datetimeFigureOut">
               <a:rPr lang="en-US" smtClean="0"/>
-              <a:t>4/9/2019</a:t>
+              <a:t>4/17/22</a:t>
             </a:fld>
             <a:endParaRPr lang="en-US"/>
           </a:p>
@@ -9989,7 +9913,7 @@
           <a:p>
             <a:fld id="{F35D5A91-02EC-B04A-8A79-709009E61D04}" type="datetimeFigureOut">
               <a:rPr lang="en-US" smtClean="0"/>
-              <a:t>4/9/2019</a:t>
+              <a:t>4/17/22</a:t>
             </a:fld>
             <a:endParaRPr lang="en-US"/>
           </a:p>
@@ -10254,7 +10178,7 @@
           <a:p>
             <a:fld id="{F35D5A91-02EC-B04A-8A79-709009E61D04}" type="datetimeFigureOut">
               <a:rPr lang="en-US" smtClean="0"/>
-              <a:t>4/9/2019</a:t>
+              <a:t>4/17/22</a:t>
             </a:fld>
             <a:endParaRPr lang="en-US"/>
           </a:p>
@@ -10666,7 +10590,7 @@
           <a:p>
             <a:fld id="{F35D5A91-02EC-B04A-8A79-709009E61D04}" type="datetimeFigureOut">
               <a:rPr lang="en-US" smtClean="0"/>
-              <a:t>4/9/2019</a:t>
+              <a:t>4/17/22</a:t>
             </a:fld>
             <a:endParaRPr lang="en-US"/>
           </a:p>
@@ -10807,7 +10731,7 @@
           <a:p>
             <a:fld id="{F35D5A91-02EC-B04A-8A79-709009E61D04}" type="datetimeFigureOut">
               <a:rPr lang="en-US" smtClean="0"/>
-              <a:t>4/9/2019</a:t>
+              <a:t>4/17/22</a:t>
             </a:fld>
             <a:endParaRPr lang="en-US"/>
           </a:p>
@@ -10920,7 +10844,7 @@
           <a:p>
             <a:fld id="{F35D5A91-02EC-B04A-8A79-709009E61D04}" type="datetimeFigureOut">
               <a:rPr lang="en-US" smtClean="0"/>
-              <a:t>4/9/2019</a:t>
+              <a:t>4/17/22</a:t>
             </a:fld>
             <a:endParaRPr lang="en-US"/>
           </a:p>
@@ -11231,7 +11155,7 @@
           <a:p>
             <a:fld id="{F35D5A91-02EC-B04A-8A79-709009E61D04}" type="datetimeFigureOut">
               <a:rPr lang="en-US" smtClean="0"/>
-              <a:t>4/9/2019</a:t>
+              <a:t>4/17/22</a:t>
             </a:fld>
             <a:endParaRPr lang="en-US"/>
           </a:p>
@@ -11519,7 +11443,7 @@
           <a:p>
             <a:fld id="{F35D5A91-02EC-B04A-8A79-709009E61D04}" type="datetimeFigureOut">
               <a:rPr lang="en-US" smtClean="0"/>
-              <a:t>4/9/2019</a:t>
+              <a:t>4/17/22</a:t>
             </a:fld>
             <a:endParaRPr lang="en-US"/>
           </a:p>
@@ -11760,7 +11684,7 @@
           <a:p>
             <a:fld id="{F35D5A91-02EC-B04A-8A79-709009E61D04}" type="datetimeFigureOut">
               <a:rPr lang="en-US" smtClean="0"/>
-              <a:t>4/9/2019</a:t>
+              <a:t>4/17/22</a:t>
             </a:fld>
             <a:endParaRPr lang="en-US"/>
           </a:p>
@@ -12209,18 +12133,13 @@
           <a:lstStyle/>
           <a:p>
             <a:r>
-              <a:rPr lang="en-US" dirty="0" smtClean="0">
+              <a:rPr lang="en-US" dirty="0">
                 <a:solidFill>
                   <a:schemeClr val="bg1"/>
                 </a:solidFill>
               </a:rPr>
               <a:t>Communicating and Documenting Architectural Decisions</a:t>
             </a:r>
-            <a:endParaRPr lang="en-US" dirty="0">
-              <a:solidFill>
-                <a:schemeClr val="bg1"/>
-              </a:solidFill>
-            </a:endParaRPr>
           </a:p>
         </p:txBody>
       </p:sp>
@@ -12248,7 +12167,7 @@
         </p:spPr>
         <p:txBody>
           <a:bodyPr>
-            <a:normAutofit fontScale="92500"/>
+            <a:normAutofit lnSpcReduction="10000"/>
           </a:bodyPr>
           <a:lstStyle/>
           <a:p>
@@ -12258,46 +12177,17 @@
                   <a:schemeClr val="bg1"/>
                 </a:solidFill>
               </a:rPr>
-              <a:t>David Ayers, </a:t>
-            </a:r>
-            <a:r>
-              <a:rPr lang="en-US" sz="3200" dirty="0" smtClean="0">
+              <a:t>David Ayers, VP of Engineering, Invitation Homes</a:t>
+            </a:r>
+          </a:p>
+          <a:p>
+            <a:r>
+              <a:rPr lang="en-US" sz="3200" dirty="0" err="1">
                 <a:solidFill>
                   <a:schemeClr val="bg1"/>
                 </a:solidFill>
               </a:rPr>
-              <a:t>Group VP of Technology, Leslie’s </a:t>
-            </a:r>
-            <a:r>
-              <a:rPr lang="en-US" sz="3200" dirty="0" err="1" smtClean="0">
-                <a:solidFill>
-                  <a:schemeClr val="bg1"/>
-                </a:solidFill>
-              </a:rPr>
-              <a:t>Poolmart</a:t>
-            </a:r>
-            <a:endParaRPr lang="en-US" sz="3200" dirty="0">
-              <a:solidFill>
-                <a:schemeClr val="bg1"/>
-              </a:solidFill>
-            </a:endParaRPr>
-          </a:p>
-          <a:p>
-            <a:r>
-              <a:rPr lang="en-US" sz="3200" dirty="0" smtClean="0">
-                <a:solidFill>
-                  <a:schemeClr val="bg1"/>
-                </a:solidFill>
-              </a:rPr>
-              <a:t>iamagiantnerd@</a:t>
-            </a:r>
-            <a:r>
-              <a:rPr lang="en-US" sz="3200" dirty="0" smtClean="0">
-                <a:solidFill>
-                  <a:schemeClr val="bg1"/>
-                </a:solidFill>
-              </a:rPr>
-              <a:t>gmail.com</a:t>
+              <a:t>david@iamagiantnerd.com</a:t>
             </a:r>
             <a:endParaRPr lang="en-US" sz="3200" dirty="0">
               <a:solidFill>
@@ -13447,20 +13337,12 @@
           <a:p>
             <a:pPr algn="ctr"/>
             <a:r>
-              <a:rPr lang="en-US" sz="2400" dirty="0" smtClean="0">
-                <a:solidFill>
-                  <a:schemeClr val="bg1"/>
-                </a:solidFill>
-              </a:rPr>
-              <a:t>Technology leader </a:t>
-            </a:r>
-            <a:r>
               <a:rPr lang="en-US" sz="2400" dirty="0">
                 <a:solidFill>
                   <a:schemeClr val="bg1"/>
                 </a:solidFill>
               </a:rPr>
-              <a:t>with 20+ years of experience building solutions to complex problems</a:t>
+              <a:t>Technology leader with 20+ years of experience building solutions to complex problems</a:t>
             </a:r>
           </a:p>
         </p:txBody>
@@ -13495,28 +13377,12 @@
           <a:p>
             <a:pPr algn="ctr"/>
             <a:r>
-              <a:rPr lang="en-US" sz="2400" dirty="0" smtClean="0">
-                <a:solidFill>
-                  <a:schemeClr val="bg1"/>
-                </a:solidFill>
-              </a:rPr>
-              <a:t>Former </a:t>
-            </a:r>
-            <a:r>
               <a:rPr lang="en-US" sz="2400" dirty="0">
                 <a:solidFill>
                   <a:schemeClr val="bg1"/>
                 </a:solidFill>
               </a:rPr>
-              <a:t>VP of Technology for The Container </a:t>
-            </a:r>
-            <a:r>
-              <a:rPr lang="en-US" sz="2400" dirty="0" smtClean="0">
-                <a:solidFill>
-                  <a:schemeClr val="bg1"/>
-                </a:solidFill>
-              </a:rPr>
-              <a:t>Store</a:t>
+              <a:t>Former VP of Technology for The Container Store</a:t>
             </a:r>
           </a:p>
         </p:txBody>
@@ -13535,8 +13401,8 @@
         </p:nvSpPr>
         <p:spPr>
           <a:xfrm>
-            <a:off x="3110109" y="2575676"/>
-            <a:ext cx="5809988" cy="461665"/>
+            <a:off x="3490861" y="2575676"/>
+            <a:ext cx="5048498" cy="461665"/>
           </a:xfrm>
           <a:prstGeom prst="rect">
             <a:avLst/>
@@ -13556,21 +13422,8 @@
                   <a:schemeClr val="bg1"/>
                 </a:solidFill>
               </a:rPr>
-              <a:t>Group VP of Technology for Leslie’s </a:t>
-            </a:r>
-            <a:r>
-              <a:rPr lang="en-US" sz="2400" dirty="0" err="1">
-                <a:solidFill>
-                  <a:schemeClr val="bg1"/>
-                </a:solidFill>
-              </a:rPr>
-              <a:t>Poolmart</a:t>
-            </a:r>
-            <a:endParaRPr lang="en-US" sz="2400" dirty="0">
-              <a:solidFill>
-                <a:schemeClr val="bg1"/>
-              </a:solidFill>
-            </a:endParaRPr>
+              <a:t>VP of Engineering for Invitation Homes</a:t>
+            </a:r>
           </a:p>
         </p:txBody>
       </p:sp>
@@ -13644,18 +13497,13 @@
           <a:p>
             <a:pPr algn="ctr"/>
             <a:r>
-              <a:rPr lang="en-US" sz="2400" dirty="0" smtClean="0">
+              <a:rPr lang="en-US" sz="2400" dirty="0">
                 <a:solidFill>
                   <a:schemeClr val="bg1"/>
                 </a:solidFill>
               </a:rPr>
               <a:t>Giant Nerd</a:t>
             </a:r>
-            <a:endParaRPr lang="en-US" sz="2400" dirty="0">
-              <a:solidFill>
-                <a:schemeClr val="bg1"/>
-              </a:solidFill>
-            </a:endParaRPr>
           </a:p>
         </p:txBody>
       </p:sp>
@@ -14223,19 +14071,7 @@
           <p:nvPr/>
         </p:nvPicPr>
         <p:blipFill>
-          <a:blip r:embed="rId3">
-            <a:extLst>
-              <a:ext uri="{BEBA8EAE-BF5A-486C-A8C5-ECC9F3942E4B}">
-                <a14:imgProps xmlns:a14="http://schemas.microsoft.com/office/drawing/2010/main">
-                  <a14:imgLayer>
-                    <a14:imgEffect>
-                      <a14:artisticBlur/>
-                    </a14:imgEffect>
-                  </a14:imgLayer>
-                </a14:imgProps>
-              </a:ext>
-            </a:extLst>
-          </a:blip>
+          <a:blip r:embed="rId3"/>
           <a:stretch>
             <a:fillRect/>
           </a:stretch>
@@ -14405,19 +14241,7 @@
           <p:nvPr/>
         </p:nvPicPr>
         <p:blipFill>
-          <a:blip r:embed="rId3">
-            <a:extLst>
-              <a:ext uri="{BEBA8EAE-BF5A-486C-A8C5-ECC9F3942E4B}">
-                <a14:imgProps xmlns:a14="http://schemas.microsoft.com/office/drawing/2010/main">
-                  <a14:imgLayer>
-                    <a14:imgEffect>
-                      <a14:artisticBlur/>
-                    </a14:imgEffect>
-                  </a14:imgLayer>
-                </a14:imgProps>
-              </a:ext>
-            </a:extLst>
-          </a:blip>
+          <a:blip r:embed="rId3"/>
           <a:stretch>
             <a:fillRect/>
           </a:stretch>
@@ -14587,19 +14411,7 @@
           <p:nvPr/>
         </p:nvPicPr>
         <p:blipFill>
-          <a:blip r:embed="rId3">
-            <a:extLst>
-              <a:ext uri="{BEBA8EAE-BF5A-486C-A8C5-ECC9F3942E4B}">
-                <a14:imgProps xmlns:a14="http://schemas.microsoft.com/office/drawing/2010/main">
-                  <a14:imgLayer>
-                    <a14:imgEffect>
-                      <a14:artisticBlur/>
-                    </a14:imgEffect>
-                  </a14:imgLayer>
-                </a14:imgProps>
-              </a:ext>
-            </a:extLst>
-          </a:blip>
+          <a:blip r:embed="rId3"/>
           <a:stretch>
             <a:fillRect/>
           </a:stretch>
@@ -14769,19 +14581,7 @@
           <p:nvPr/>
         </p:nvPicPr>
         <p:blipFill>
-          <a:blip r:embed="rId3">
-            <a:extLst>
-              <a:ext uri="{BEBA8EAE-BF5A-486C-A8C5-ECC9F3942E4B}">
-                <a14:imgProps xmlns:a14="http://schemas.microsoft.com/office/drawing/2010/main">
-                  <a14:imgLayer>
-                    <a14:imgEffect>
-                      <a14:artisticBlur/>
-                    </a14:imgEffect>
-                  </a14:imgLayer>
-                </a14:imgProps>
-              </a:ext>
-            </a:extLst>
-          </a:blip>
+          <a:blip r:embed="rId3"/>
           <a:stretch>
             <a:fillRect/>
           </a:stretch>
@@ -15088,19 +14888,7 @@
           <p:nvPr/>
         </p:nvPicPr>
         <p:blipFill>
-          <a:blip r:embed="rId3">
-            <a:extLst>
-              <a:ext uri="{BEBA8EAE-BF5A-486C-A8C5-ECC9F3942E4B}">
-                <a14:imgProps xmlns:a14="http://schemas.microsoft.com/office/drawing/2010/main">
-                  <a14:imgLayer>
-                    <a14:imgEffect>
-                      <a14:artisticBlur/>
-                    </a14:imgEffect>
-                  </a14:imgLayer>
-                </a14:imgProps>
-              </a:ext>
-            </a:extLst>
-          </a:blip>
+          <a:blip r:embed="rId3"/>
           <a:stretch>
             <a:fillRect/>
           </a:stretch>
@@ -15270,19 +15058,7 @@
           <p:nvPr/>
         </p:nvPicPr>
         <p:blipFill>
-          <a:blip r:embed="rId3">
-            <a:extLst>
-              <a:ext uri="{BEBA8EAE-BF5A-486C-A8C5-ECC9F3942E4B}">
-                <a14:imgProps xmlns:a14="http://schemas.microsoft.com/office/drawing/2010/main">
-                  <a14:imgLayer>
-                    <a14:imgEffect>
-                      <a14:artisticBlur/>
-                    </a14:imgEffect>
-                  </a14:imgLayer>
-                </a14:imgProps>
-              </a:ext>
-            </a:extLst>
-          </a:blip>
+          <a:blip r:embed="rId3"/>
           <a:stretch>
             <a:fillRect/>
           </a:stretch>
@@ -15561,10 +15337,6 @@
             <a:br>
               <a:rPr lang="en-US" sz="6600" dirty="0"/>
             </a:br>
-            <a:r>
-              <a:rPr lang="en-US" sz="6600" dirty="0"/>
-              <a:t/>
-            </a:r>
             <a:br>
               <a:rPr lang="en-US" sz="6600" dirty="0"/>
             </a:br>
@@ -15679,10 +15451,6 @@
             <a:r>
               <a:rPr lang="en-US" sz="6600" dirty="0" err="1"/>
               <a:t>ThoughtWorks</a:t>
-            </a:r>
-            <a:r>
-              <a:rPr lang="en-US" sz="6600" dirty="0"/>
-              <a:t/>
             </a:r>
             <a:br>
               <a:rPr lang="en-US" sz="6600" dirty="0"/>
@@ -15906,25 +15674,8 @@
                   </a:schemeClr>
                 </a:solidFill>
               </a:rPr>
-              <a:t>Build Reference </a:t>
-            </a:r>
-            <a:r>
-              <a:rPr lang="en-US" sz="4000" dirty="0" smtClean="0">
-                <a:solidFill>
-                  <a:schemeClr val="bg1">
-                    <a:lumMod val="75000"/>
-                  </a:schemeClr>
-                </a:solidFill>
-              </a:rPr>
-              <a:t>Implementations</a:t>
-            </a:r>
-            <a:endParaRPr lang="en-US" sz="4000" dirty="0">
-              <a:solidFill>
-                <a:schemeClr val="bg1">
-                  <a:lumMod val="75000"/>
-                </a:schemeClr>
-              </a:solidFill>
-            </a:endParaRPr>
+              <a:t>Build Reference Implementations</a:t>
+            </a:r>
           </a:p>
         </p:txBody>
       </p:sp>
@@ -16144,10 +15895,9 @@
           <a:p>
             <a:pPr algn="ctr"/>
             <a:r>
-              <a:rPr lang="en-US" sz="6600" dirty="0" smtClean="0"/>
+              <a:rPr lang="en-US" sz="6600" dirty="0"/>
               <a:t>The Problem</a:t>
             </a:r>
-            <a:endParaRPr lang="en-US" sz="6600" dirty="0"/>
           </a:p>
         </p:txBody>
       </p:sp>
@@ -16220,15 +15970,7 @@
             <a:pPr algn="ctr"/>
             <a:r>
               <a:rPr lang="en-US" sz="6600" dirty="0"/>
-              <a:t>Two </a:t>
-            </a:r>
-            <a:r>
-              <a:rPr lang="en-US" sz="6600" dirty="0" smtClean="0"/>
-              <a:t>Pizzas</a:t>
-            </a:r>
-            <a:r>
-              <a:rPr lang="en-US" sz="6600" dirty="0"/>
-              <a:t>!</a:t>
+              <a:t>Two Pizzas!</a:t>
             </a:r>
             <a:endParaRPr lang="en-US" sz="15000" dirty="0"/>
           </a:p>
@@ -17366,10 +17108,9 @@
           <a:p>
             <a:pPr algn="ctr"/>
             <a:r>
-              <a:rPr lang="en-US" sz="6600" dirty="0" smtClean="0"/>
+              <a:rPr lang="en-US" sz="6600" dirty="0"/>
               <a:t>The Curious Case of MongoDB</a:t>
             </a:r>
-            <a:endParaRPr lang="en-US" sz="6600" dirty="0"/>
           </a:p>
         </p:txBody>
       </p:sp>
@@ -17998,21 +17739,8 @@
                   <a:schemeClr val="bg1"/>
                 </a:solidFill>
               </a:rPr>
-              <a:t>Build Reference </a:t>
-            </a:r>
-            <a:r>
-              <a:rPr lang="en-US" sz="4000" dirty="0" smtClean="0">
-                <a:solidFill>
-                  <a:schemeClr val="bg1"/>
-                </a:solidFill>
-              </a:rPr>
-              <a:t>Implementations</a:t>
-            </a:r>
-            <a:endParaRPr lang="en-US" sz="4000" dirty="0">
-              <a:solidFill>
-                <a:schemeClr val="bg1"/>
-              </a:solidFill>
-            </a:endParaRPr>
+              <a:t>Build Reference Implementations</a:t>
+            </a:r>
           </a:p>
         </p:txBody>
       </p:sp>
@@ -18886,21 +18614,8 @@
                   <a:schemeClr val="bg1"/>
                 </a:solidFill>
               </a:rPr>
-              <a:t>Build Reference </a:t>
-            </a:r>
-            <a:r>
-              <a:rPr lang="en-US" sz="4000" dirty="0" smtClean="0">
-                <a:solidFill>
-                  <a:schemeClr val="bg1"/>
-                </a:solidFill>
-              </a:rPr>
-              <a:t>Implementations</a:t>
-            </a:r>
-            <a:endParaRPr lang="en-US" sz="4000" dirty="0">
-              <a:solidFill>
-                <a:schemeClr val="bg1"/>
-              </a:solidFill>
-            </a:endParaRPr>
+              <a:t>Build Reference Implementations</a:t>
+            </a:r>
           </a:p>
         </p:txBody>
       </p:sp>
@@ -19357,28 +19072,15 @@
             <a:pPr algn="ctr"/>
             <a:r>
               <a:rPr lang="en-US" sz="6600" dirty="0"/>
-              <a:t>Bonus </a:t>
-            </a:r>
-            <a:r>
-              <a:rPr lang="en-US" sz="6600" dirty="0" smtClean="0"/>
-              <a:t>Technique</a:t>
-            </a:r>
-            <a:r>
+              <a:t>Bonus Technique: </a:t>
+            </a:r>
+            <a:br>
               <a:rPr lang="en-US" sz="6600" dirty="0"/>
-              <a:t>: </a:t>
-            </a:r>
-            <a:r>
-              <a:rPr lang="en-US" sz="6600" dirty="0" smtClean="0"/>
-              <a:t/>
-            </a:r>
-            <a:br>
-              <a:rPr lang="en-US" sz="6600" dirty="0" smtClean="0"/>
             </a:br>
             <a:r>
-              <a:rPr lang="en-US" sz="6600" dirty="0" smtClean="0"/>
+              <a:rPr lang="en-US" sz="6600" dirty="0"/>
               <a:t>Tracer Bullet/Steel Thread</a:t>
             </a:r>
-            <a:endParaRPr lang="en-US" sz="6600" dirty="0"/>
           </a:p>
         </p:txBody>
       </p:sp>
@@ -19556,63 +19258,27 @@
         </p:spPr>
         <p:txBody>
           <a:bodyPr>
-            <a:normAutofit fontScale="85000" lnSpcReduction="20000"/>
+            <a:normAutofit lnSpcReduction="10000"/>
           </a:bodyPr>
           <a:lstStyle/>
           <a:p>
-            <a:endParaRPr lang="en-US" sz="3200" dirty="0" smtClean="0">
-              <a:solidFill>
-                <a:schemeClr val="bg1"/>
-              </a:solidFill>
-            </a:endParaRPr>
-          </a:p>
-          <a:p>
-            <a:r>
-              <a:rPr lang="en-US" sz="3200" dirty="0" smtClean="0">
-                <a:solidFill>
-                  <a:schemeClr val="bg1"/>
-                </a:solidFill>
-              </a:rPr>
-              <a:t>David </a:t>
-            </a:r>
             <a:r>
               <a:rPr lang="en-US" sz="3200" dirty="0">
                 <a:solidFill>
                   <a:schemeClr val="bg1"/>
                 </a:solidFill>
               </a:rPr>
-              <a:t>Ayers, Group VP of Technology, Leslie’s </a:t>
-            </a:r>
+              <a:t>David Ayers, VP of Engineering, Invitation Homes</a:t>
+            </a:r>
+          </a:p>
+          <a:p>
             <a:r>
               <a:rPr lang="en-US" sz="3200" dirty="0" err="1">
                 <a:solidFill>
                   <a:schemeClr val="bg1"/>
                 </a:solidFill>
               </a:rPr>
-              <a:t>Poolmart</a:t>
-            </a:r>
-            <a:endParaRPr lang="en-US" sz="3200" dirty="0">
-              <a:solidFill>
-                <a:schemeClr val="bg1"/>
-              </a:solidFill>
-            </a:endParaRPr>
-          </a:p>
-          <a:p>
-            <a:r>
-              <a:rPr lang="en-US" sz="3200" dirty="0" smtClean="0">
-                <a:solidFill>
-                  <a:schemeClr val="bg1"/>
-                </a:solidFill>
-              </a:rPr>
-              <a:t>iamagiantnerd@</a:t>
-            </a:r>
-            <a:r>
-              <a:rPr lang="en-US" sz="3200" dirty="0" smtClean="0">
-                <a:solidFill>
-                  <a:schemeClr val="bg1"/>
-                </a:solidFill>
-              </a:rPr>
-              <a:t>gmail.com</a:t>
+              <a:t>david@iamagiantnerd.com</a:t>
             </a:r>
             <a:endParaRPr lang="en-US" sz="3200" dirty="0">
               <a:solidFill>
@@ -19787,25 +19453,8 @@
                   </a:schemeClr>
                 </a:solidFill>
               </a:rPr>
-              <a:t>Build Reference </a:t>
-            </a:r>
-            <a:r>
-              <a:rPr lang="en-US" sz="4000" dirty="0" smtClean="0">
-                <a:solidFill>
-                  <a:schemeClr val="bg1">
-                    <a:lumMod val="75000"/>
-                  </a:schemeClr>
-                </a:solidFill>
-              </a:rPr>
-              <a:t>Implementations</a:t>
-            </a:r>
-            <a:endParaRPr lang="en-US" sz="4000" dirty="0">
-              <a:solidFill>
-                <a:schemeClr val="bg1">
-                  <a:lumMod val="75000"/>
-                </a:schemeClr>
-              </a:solidFill>
-            </a:endParaRPr>
+              <a:t>Build Reference Implementations</a:t>
+            </a:r>
           </a:p>
         </p:txBody>
       </p:sp>
@@ -20606,4 +20255,10 @@
     </a:ext>
   </a:extLst>
 </a:theme>
+</file>
+
+<file path=docMetadata/LabelInfo.xml><?xml version="1.0" encoding="utf-8"?>
+<clbl:labelList xmlns:clbl="http://schemas.microsoft.com/office/2020/mipLabelMetadata">
+  <clbl:label id="{1c945a3b-6160-4713-9831-294a2026c015}" enabled="1" method="Privileged" siteId="{0101c982-42b5-4932-8d76-28b81fc704c8}" contentBits="0" removed="0"/>
+</clbl:labelList>
 </file>
</xml_diff>

<commit_message>
Last minute changes to 30-min version for presentation
</commit_message>
<xml_diff>
--- a/comm-and-doc-arch-decisions-30-min.pptx
+++ b/comm-and-doc-arch-decisions-30-min.pptx
@@ -5,7 +5,7 @@
     <p:sldMasterId id="2147483648" r:id="rId1"/>
   </p:sldMasterIdLst>
   <p:notesMasterIdLst>
-    <p:notesMasterId r:id="rId69"/>
+    <p:notesMasterId r:id="rId68"/>
   </p:notesMasterIdLst>
   <p:sldIdLst>
     <p:sldId id="256" r:id="rId2"/>
@@ -72,9 +72,8 @@
     <p:sldId id="338" r:id="rId63"/>
     <p:sldId id="339" r:id="rId64"/>
     <p:sldId id="340" r:id="rId65"/>
-    <p:sldId id="372" r:id="rId66"/>
-    <p:sldId id="373" r:id="rId67"/>
-    <p:sldId id="374" r:id="rId68"/>
+    <p:sldId id="373" r:id="rId66"/>
+    <p:sldId id="374" r:id="rId67"/>
   </p:sldIdLst>
   <p:sldSz cx="12192000" cy="6858000"/>
   <p:notesSz cx="6858000" cy="9144000"/>
@@ -933,7 +932,7 @@
           <a:p>
             <a:fld id="{6525C509-FCE7-1E4E-BABF-F948CC4246E2}" type="datetimeFigureOut">
               <a:rPr lang="en-US" smtClean="0"/>
-              <a:t>4/17/22</a:t>
+              <a:t>4/26/22</a:t>
             </a:fld>
             <a:endParaRPr lang="en-US"/>
           </a:p>
@@ -2649,7 +2648,19 @@
               <a:rPr lang="en-US" b="0" dirty="0">
                 <a:effectLst/>
               </a:rPr>
-              <a:t>Markdown is a lightweight markup language that creates human readable text documents, but can be rendered by many different engines as HTML pages.</a:t>
+              <a:t>Markdown is a lightweight markup language that creates human readable text documents, but can be rendered by many different engines as HTML pages. And bonus – if you use </a:t>
+            </a:r>
+            <a:r>
+              <a:rPr lang="en-US" b="0" dirty="0" err="1">
+                <a:effectLst/>
+              </a:rPr>
+              <a:t>Github</a:t>
+            </a:r>
+            <a:r>
+              <a:rPr lang="en-US" b="0" dirty="0">
+                <a:effectLst/>
+              </a:rPr>
+              <a:t>, you get nice rendering of Markdown docs for free!</a:t>
             </a:r>
           </a:p>
         </p:txBody>
@@ -2946,9 +2957,12 @@
           <a:lstStyle/>
           <a:p>
             <a:pPr rtl="0"/>
-            <a:endParaRPr lang="en-US" b="0" dirty="0">
-              <a:effectLst/>
-            </a:endParaRPr>
+            <a:r>
+              <a:rPr lang="en-US" b="0" dirty="0">
+                <a:effectLst/>
+              </a:rPr>
+              <a:t>Or “decision-records”.</a:t>
+            </a:r>
           </a:p>
         </p:txBody>
       </p:sp>
@@ -4123,7 +4137,7 @@
                 <a:ea typeface="+mn-ea"/>
                 <a:cs typeface="+mn-cs"/>
               </a:rPr>
-              <a:t>github</a:t>
+              <a:t>Github</a:t>
             </a:r>
             <a:r>
               <a:rPr lang="en-US" sz="1200" b="0" i="0" u="none" strike="noStrike" kern="1200" dirty="0">
@@ -4263,7 +4277,7 @@
                 <a:ea typeface="+mn-ea"/>
                 <a:cs typeface="+mn-cs"/>
               </a:rPr>
-              <a:t>These were kept in a special repo on </a:t>
+              <a:t>These were kept in a special repo (technology-decision) on </a:t>
             </a:r>
             <a:r>
               <a:rPr lang="en-US" sz="1200" b="0" i="0" u="none" strike="noStrike" kern="1200" dirty="0" err="1">
@@ -4275,7 +4289,7 @@
                 <a:ea typeface="+mn-ea"/>
                 <a:cs typeface="+mn-cs"/>
               </a:rPr>
-              <a:t>github</a:t>
+              <a:t>Github</a:t>
             </a:r>
             <a:r>
               <a:rPr lang="en-US" sz="1200" b="0" i="0" u="none" strike="noStrike" kern="1200" dirty="0">
@@ -4426,7 +4440,7 @@
                 <a:ea typeface="+mn-ea"/>
                 <a:cs typeface="+mn-cs"/>
               </a:rPr>
-              <a:t>If you're not familiar with workflows like this, it's a common open source technique to review code that's "proposed" to be added to a codebase. Many enterprises have adopted this to add a layer of peer code review into their processes.</a:t>
+              <a:t>If you're not familiar with workflows like this, it's a common open-source technique to review code that's "proposed" to be added to a codebase. Many enterprises have adopted this to add a layer of peer code review into their processes.</a:t>
             </a:r>
           </a:p>
           <a:p>
@@ -4453,7 +4467,7 @@
                 <a:ea typeface="+mn-ea"/>
                 <a:cs typeface="+mn-cs"/>
               </a:rPr>
-              <a:t>A new ADR was proposed by opening a pull request, and conversation and comments added to the ADR. It was then "adopted' when it was discussed in the Architecture Guild (which we'll discuss later).</a:t>
+              <a:t>A new ADR is proposed by opening a pull request, and conversation and comments are added to the ADR. It was then "adopted' when it was discussed in the Architecture Guild (which we'll discuss later).</a:t>
             </a:r>
             <a:endParaRPr lang="en-US" b="0" dirty="0">
               <a:effectLst/>
@@ -5182,7 +5196,7 @@
               <a:rPr lang="en-US" b="0" dirty="0">
                 <a:effectLst/>
               </a:rPr>
-              <a:t>As technology leaders, we are responsible for maintaining the health,</a:t>
+              <a:t>As technologists and leaders, we are responsible for maintaining the health,</a:t>
             </a:r>
             <a:r>
               <a:rPr lang="en-US" b="0" baseline="0" dirty="0">
@@ -5203,7 +5217,7 @@
               <a:rPr lang="en-US" b="0" baseline="0" dirty="0">
                 <a:effectLst/>
               </a:rPr>
-              <a:t>With decentralized decision making happing all around us, how to we provide some guard rails and a safety net to protect our teams (and our systems) from the dangers that are lurking out there. Because, make no mistake, they are lurking.</a:t>
+              <a:t>With decentralized decision making happening all around us, how to we provide some guard rails and a safety net to protect our teams (and our systems) from the dangers that are lurking out there. Because, make no mistake, they are lurking.</a:t>
             </a:r>
           </a:p>
           <a:p>
@@ -5892,7 +5906,7 @@
                 <a:ea typeface="+mn-ea"/>
                 <a:cs typeface="+mn-cs"/>
               </a:rPr>
-              <a:t>Obviously, such a large group is an inefficient way to make decisions. But, it's a great group for lively discussions around topics where lots of people have passions.</a:t>
+              <a:t>Obviously, such a large group is an inefficient way to make decisions. But it's a great group for lively discussions around topics where lots of people have passions.</a:t>
             </a:r>
             <a:endParaRPr lang="en-US" b="0" dirty="0">
               <a:effectLst/>
@@ -7703,7 +7717,7 @@
                 <a:ea typeface="+mn-ea"/>
                 <a:cs typeface="+mn-cs"/>
               </a:rPr>
-              <a:t> to help make, document, and socialize our architectural decisions, and today, I’m going to talk about 3 of them</a:t>
+              <a:t> to help make, document, and socialize our architectural decisions, and today, I’m going to talk about 3 of them. To be clear – socialization of decisions is hard and will take commitment. These 3 techniques improve the odds of success, but there will still need to be effort put into further socializing decisions.</a:t>
             </a:r>
           </a:p>
         </p:txBody>
@@ -8312,7 +8326,53 @@
                 <a:ea typeface="+mn-ea"/>
                 <a:cs typeface="+mn-cs"/>
               </a:rPr>
-              <a:t>A great technique for this is a "tracer bullet"; minimal functionality that exercises all of the seams between teams in a project. It doesn't have to be fully functional, but it does actually have to interact with each system that will be present in the final solution. Doing this early, as part of the project inception, gives the team a strong foundation to build on for the rest of the project, and it usually exposes things that weren't properly thought out (that can lead to ADRs for the project!).</a:t>
+              <a:t>As I said at the beginning, Enterprise Architecture is at a crossroads, especially in organizations which do a lot of custom software development. This may sounds like hyperbole, but I think the tensions between these new ways of doing things and the "traditional" approach to Enterprise Architecture are very real.</a:t>
+            </a:r>
+            <a:endParaRPr lang="en-US" b="0" dirty="0">
+              <a:effectLst/>
+            </a:endParaRPr>
+          </a:p>
+          <a:p>
+            <a:pPr rtl="0"/>
+            <a:br>
+              <a:rPr lang="en-US" b="0" dirty="0">
+                <a:effectLst/>
+              </a:rPr>
+            </a:br>
+            <a:r>
+              <a:rPr lang="en-US" sz="1200" b="0" i="0" u="none" strike="noStrike" kern="1200" dirty="0">
+                <a:solidFill>
+                  <a:schemeClr val="tx1"/>
+                </a:solidFill>
+                <a:effectLst/>
+                <a:latin typeface="+mn-lt"/>
+                <a:ea typeface="+mn-ea"/>
+                <a:cs typeface="+mn-cs"/>
+              </a:rPr>
+              <a:t>I think that Enterprise Architecture professionals need to look at techniques like the ones I have presented here, and look to add them to their professional "toolbox". This doesn't mean abandoning "traditional" approaches. I'm suggesting an evolution, not a revolution. But change is going to be necessary, because the rest of technology is changing, whether we like it or not.</a:t>
+            </a:r>
+            <a:endParaRPr lang="en-US" b="0" dirty="0">
+              <a:effectLst/>
+            </a:endParaRPr>
+          </a:p>
+          <a:p>
+            <a:pPr rtl="0"/>
+            <a:br>
+              <a:rPr lang="en-US" b="0" dirty="0">
+                <a:effectLst/>
+              </a:rPr>
+            </a:br>
+            <a:r>
+              <a:rPr lang="en-US" sz="1200" b="0" i="0" u="none" strike="noStrike" kern="1200" dirty="0">
+                <a:solidFill>
+                  <a:schemeClr val="tx1"/>
+                </a:solidFill>
+                <a:effectLst/>
+                <a:latin typeface="+mn-lt"/>
+                <a:ea typeface="+mn-ea"/>
+                <a:cs typeface="+mn-cs"/>
+              </a:rPr>
+              <a:t>Hopefully I've given you some idea to think about and maybe adopt. Thank you for your time!</a:t>
             </a:r>
             <a:endParaRPr lang="en-US" b="0" dirty="0">
               <a:effectLst/>
@@ -8346,7 +8406,7 @@
     </p:spTree>
     <p:extLst>
       <p:ext uri="{BB962C8B-B14F-4D97-AF65-F5344CB8AC3E}">
-        <p14:creationId xmlns:p14="http://schemas.microsoft.com/office/powerpoint/2010/main" val="4254838272"/>
+        <p14:creationId xmlns:p14="http://schemas.microsoft.com/office/powerpoint/2010/main" val="2456180645"/>
       </p:ext>
     </p:extLst>
   </p:cSld>
@@ -8383,12 +8443,7 @@
             <p:ph type="sldImg"/>
           </p:nvPr>
         </p:nvSpPr>
-        <p:spPr>
-          <a:xfrm>
-            <a:off x="685800" y="1143000"/>
-            <a:ext cx="5486400" cy="3086100"/>
-          </a:xfrm>
-        </p:spPr>
+        <p:spPr/>
       </p:sp>
       <p:sp>
         <p:nvSpPr>
@@ -8405,68 +8460,7 @@
           <a:bodyPr/>
           <a:lstStyle/>
           <a:p>
-            <a:pPr rtl="0"/>
-            <a:r>
-              <a:rPr lang="en-US" sz="1200" b="0" i="0" u="none" strike="noStrike" kern="1200" dirty="0">
-                <a:solidFill>
-                  <a:schemeClr val="tx1"/>
-                </a:solidFill>
-                <a:effectLst/>
-                <a:latin typeface="+mn-lt"/>
-                <a:ea typeface="+mn-ea"/>
-                <a:cs typeface="+mn-cs"/>
-              </a:rPr>
-              <a:t>As I said at the beginning, Enterprise Architecture is at a crossroads, especially in organizations which do a lot of custom software development. This may sounds like hyperbole, but I think the tensions between these new ways of doing things and the "traditional" approach to Enterprise Architecture are very real.</a:t>
-            </a:r>
-            <a:endParaRPr lang="en-US" b="0" dirty="0">
-              <a:effectLst/>
-            </a:endParaRPr>
-          </a:p>
-          <a:p>
-            <a:pPr rtl="0"/>
-            <a:br>
-              <a:rPr lang="en-US" b="0" dirty="0">
-                <a:effectLst/>
-              </a:rPr>
-            </a:br>
-            <a:r>
-              <a:rPr lang="en-US" sz="1200" b="0" i="0" u="none" strike="noStrike" kern="1200" dirty="0">
-                <a:solidFill>
-                  <a:schemeClr val="tx1"/>
-                </a:solidFill>
-                <a:effectLst/>
-                <a:latin typeface="+mn-lt"/>
-                <a:ea typeface="+mn-ea"/>
-                <a:cs typeface="+mn-cs"/>
-              </a:rPr>
-              <a:t>I think that Enterprise Architecture professionals need to look at techniques like the ones I have presented here, and look to add them to their professional "toolbox". This doesn't mean abandoning "traditional" approaches. I'm suggesting an evolution, not a revolution. But change is going to be necessary, because the rest of technology is changing, whether we like it or not.</a:t>
-            </a:r>
-            <a:endParaRPr lang="en-US" b="0" dirty="0">
-              <a:effectLst/>
-            </a:endParaRPr>
-          </a:p>
-          <a:p>
-            <a:pPr rtl="0"/>
-            <a:br>
-              <a:rPr lang="en-US" b="0" dirty="0">
-                <a:effectLst/>
-              </a:rPr>
-            </a:br>
-            <a:r>
-              <a:rPr lang="en-US" sz="1200" b="0" i="0" u="none" strike="noStrike" kern="1200" dirty="0">
-                <a:solidFill>
-                  <a:schemeClr val="tx1"/>
-                </a:solidFill>
-                <a:effectLst/>
-                <a:latin typeface="+mn-lt"/>
-                <a:ea typeface="+mn-ea"/>
-                <a:cs typeface="+mn-cs"/>
-              </a:rPr>
-              <a:t>Hopefully I've given you some idea to think about and maybe adopt. Thank you for your time!</a:t>
-            </a:r>
-            <a:endParaRPr lang="en-US" b="0" dirty="0">
-              <a:effectLst/>
-            </a:endParaRPr>
+            <a:endParaRPr lang="en-US" dirty="0"/>
           </a:p>
         </p:txBody>
       </p:sp>
@@ -8488,90 +8482,6 @@
             <a:fld id="{096F4AFB-61BD-1340-90B6-0FECED04B0A2}" type="slidenum">
               <a:rPr lang="en-US" smtClean="0"/>
               <a:t>66</a:t>
-            </a:fld>
-            <a:endParaRPr lang="en-US"/>
-          </a:p>
-        </p:txBody>
-      </p:sp>
-    </p:spTree>
-    <p:extLst>
-      <p:ext uri="{BB962C8B-B14F-4D97-AF65-F5344CB8AC3E}">
-        <p14:creationId xmlns:p14="http://schemas.microsoft.com/office/powerpoint/2010/main" val="2456180645"/>
-      </p:ext>
-    </p:extLst>
-  </p:cSld>
-  <p:clrMapOvr>
-    <a:masterClrMapping/>
-  </p:clrMapOvr>
-</p:notes>
-</file>
-
-<file path=ppt/notesSlides/notesSlide67.xml><?xml version="1.0" encoding="utf-8"?>
-<p:notes xmlns:a="http://schemas.openxmlformats.org/drawingml/2006/main" xmlns:r="http://schemas.openxmlformats.org/officeDocument/2006/relationships" xmlns:p="http://schemas.openxmlformats.org/presentationml/2006/main">
-  <p:cSld>
-    <p:spTree>
-      <p:nvGrpSpPr>
-        <p:cNvPr id="1" name=""/>
-        <p:cNvGrpSpPr/>
-        <p:nvPr/>
-      </p:nvGrpSpPr>
-      <p:grpSpPr>
-        <a:xfrm>
-          <a:off x="0" y="0"/>
-          <a:ext cx="0" cy="0"/>
-          <a:chOff x="0" y="0"/>
-          <a:chExt cx="0" cy="0"/>
-        </a:xfrm>
-      </p:grpSpPr>
-      <p:sp>
-        <p:nvSpPr>
-          <p:cNvPr id="2" name="Slide Image Placeholder 1"/>
-          <p:cNvSpPr>
-            <a:spLocks noGrp="1" noRot="1" noChangeAspect="1"/>
-          </p:cNvSpPr>
-          <p:nvPr>
-            <p:ph type="sldImg"/>
-          </p:nvPr>
-        </p:nvSpPr>
-        <p:spPr/>
-      </p:sp>
-      <p:sp>
-        <p:nvSpPr>
-          <p:cNvPr id="3" name="Notes Placeholder 2"/>
-          <p:cNvSpPr>
-            <a:spLocks noGrp="1"/>
-          </p:cNvSpPr>
-          <p:nvPr>
-            <p:ph type="body" idx="1"/>
-          </p:nvPr>
-        </p:nvSpPr>
-        <p:spPr/>
-        <p:txBody>
-          <a:bodyPr/>
-          <a:lstStyle/>
-          <a:p>
-            <a:endParaRPr lang="en-US" dirty="0"/>
-          </a:p>
-        </p:txBody>
-      </p:sp>
-      <p:sp>
-        <p:nvSpPr>
-          <p:cNvPr id="4" name="Slide Number Placeholder 3"/>
-          <p:cNvSpPr>
-            <a:spLocks noGrp="1"/>
-          </p:cNvSpPr>
-          <p:nvPr>
-            <p:ph type="sldNum" sz="quarter" idx="10"/>
-          </p:nvPr>
-        </p:nvSpPr>
-        <p:spPr/>
-        <p:txBody>
-          <a:bodyPr/>
-          <a:lstStyle/>
-          <a:p>
-            <a:fld id="{096F4AFB-61BD-1340-90B6-0FECED04B0A2}" type="slidenum">
-              <a:rPr lang="en-US" smtClean="0"/>
-              <a:t>67</a:t>
             </a:fld>
             <a:endParaRPr lang="en-US"/>
           </a:p>
@@ -9034,7 +8944,7 @@
           <a:p>
             <a:fld id="{F35D5A91-02EC-B04A-8A79-709009E61D04}" type="datetimeFigureOut">
               <a:rPr lang="en-US" smtClean="0"/>
-              <a:t>4/17/22</a:t>
+              <a:t>4/26/22</a:t>
             </a:fld>
             <a:endParaRPr lang="en-US"/>
           </a:p>
@@ -9232,7 +9142,7 @@
           <a:p>
             <a:fld id="{F35D5A91-02EC-B04A-8A79-709009E61D04}" type="datetimeFigureOut">
               <a:rPr lang="en-US" smtClean="0"/>
-              <a:t>4/17/22</a:t>
+              <a:t>4/26/22</a:t>
             </a:fld>
             <a:endParaRPr lang="en-US"/>
           </a:p>
@@ -9440,7 +9350,7 @@
           <a:p>
             <a:fld id="{F35D5A91-02EC-B04A-8A79-709009E61D04}" type="datetimeFigureOut">
               <a:rPr lang="en-US" smtClean="0"/>
-              <a:t>4/17/22</a:t>
+              <a:t>4/26/22</a:t>
             </a:fld>
             <a:endParaRPr lang="en-US"/>
           </a:p>
@@ -9638,7 +9548,7 @@
           <a:p>
             <a:fld id="{F35D5A91-02EC-B04A-8A79-709009E61D04}" type="datetimeFigureOut">
               <a:rPr lang="en-US" smtClean="0"/>
-              <a:t>4/17/22</a:t>
+              <a:t>4/26/22</a:t>
             </a:fld>
             <a:endParaRPr lang="en-US"/>
           </a:p>
@@ -9913,7 +9823,7 @@
           <a:p>
             <a:fld id="{F35D5A91-02EC-B04A-8A79-709009E61D04}" type="datetimeFigureOut">
               <a:rPr lang="en-US" smtClean="0"/>
-              <a:t>4/17/22</a:t>
+              <a:t>4/26/22</a:t>
             </a:fld>
             <a:endParaRPr lang="en-US"/>
           </a:p>
@@ -10178,7 +10088,7 @@
           <a:p>
             <a:fld id="{F35D5A91-02EC-B04A-8A79-709009E61D04}" type="datetimeFigureOut">
               <a:rPr lang="en-US" smtClean="0"/>
-              <a:t>4/17/22</a:t>
+              <a:t>4/26/22</a:t>
             </a:fld>
             <a:endParaRPr lang="en-US"/>
           </a:p>
@@ -10590,7 +10500,7 @@
           <a:p>
             <a:fld id="{F35D5A91-02EC-B04A-8A79-709009E61D04}" type="datetimeFigureOut">
               <a:rPr lang="en-US" smtClean="0"/>
-              <a:t>4/17/22</a:t>
+              <a:t>4/26/22</a:t>
             </a:fld>
             <a:endParaRPr lang="en-US"/>
           </a:p>
@@ -10731,7 +10641,7 @@
           <a:p>
             <a:fld id="{F35D5A91-02EC-B04A-8A79-709009E61D04}" type="datetimeFigureOut">
               <a:rPr lang="en-US" smtClean="0"/>
-              <a:t>4/17/22</a:t>
+              <a:t>4/26/22</a:t>
             </a:fld>
             <a:endParaRPr lang="en-US"/>
           </a:p>
@@ -10844,7 +10754,7 @@
           <a:p>
             <a:fld id="{F35D5A91-02EC-B04A-8A79-709009E61D04}" type="datetimeFigureOut">
               <a:rPr lang="en-US" smtClean="0"/>
-              <a:t>4/17/22</a:t>
+              <a:t>4/26/22</a:t>
             </a:fld>
             <a:endParaRPr lang="en-US"/>
           </a:p>
@@ -11155,7 +11065,7 @@
           <a:p>
             <a:fld id="{F35D5A91-02EC-B04A-8A79-709009E61D04}" type="datetimeFigureOut">
               <a:rPr lang="en-US" smtClean="0"/>
-              <a:t>4/17/22</a:t>
+              <a:t>4/26/22</a:t>
             </a:fld>
             <a:endParaRPr lang="en-US"/>
           </a:p>
@@ -11443,7 +11353,7 @@
           <a:p>
             <a:fld id="{F35D5A91-02EC-B04A-8A79-709009E61D04}" type="datetimeFigureOut">
               <a:rPr lang="en-US" smtClean="0"/>
-              <a:t>4/17/22</a:t>
+              <a:t>4/26/22</a:t>
             </a:fld>
             <a:endParaRPr lang="en-US"/>
           </a:p>
@@ -11684,7 +11594,7 @@
           <a:p>
             <a:fld id="{F35D5A91-02EC-B04A-8A79-709009E61D04}" type="datetimeFigureOut">
               <a:rPr lang="en-US" smtClean="0"/>
-              <a:t>4/17/22</a:t>
+              <a:t>4/26/22</a:t>
             </a:fld>
             <a:endParaRPr lang="en-US"/>
           </a:p>
@@ -17384,7 +17294,7 @@
             </a:pPr>
             <a:r>
               <a:rPr lang="en-US" sz="3600" dirty="0"/>
-              <a:t>Review and discuss open ADRs, either 1) voting to adopt, or 2) sending back for more work &amp; discussion</a:t>
+              <a:t>Review and discuss open ADRs, either 1) deciding to adopt, or 2) sending back for more work &amp; discussion</a:t>
             </a:r>
           </a:p>
           <a:p>
@@ -19022,87 +18932,6 @@
     <p:bg>
       <p:bgPr>
         <a:solidFill>
-          <a:schemeClr val="accent5"/>
-        </a:solidFill>
-        <a:effectLst/>
-      </p:bgPr>
-    </p:bg>
-    <p:spTree>
-      <p:nvGrpSpPr>
-        <p:cNvPr id="1" name=""/>
-        <p:cNvGrpSpPr/>
-        <p:nvPr/>
-      </p:nvGrpSpPr>
-      <p:grpSpPr>
-        <a:xfrm>
-          <a:off x="0" y="0"/>
-          <a:ext cx="0" cy="0"/>
-          <a:chOff x="0" y="0"/>
-          <a:chExt cx="0" cy="0"/>
-        </a:xfrm>
-      </p:grpSpPr>
-      <p:sp>
-        <p:nvSpPr>
-          <p:cNvPr id="2" name="Title 1">
-            <a:extLst>
-              <a:ext uri="{FF2B5EF4-FFF2-40B4-BE49-F238E27FC236}">
-                <a16:creationId xmlns:a16="http://schemas.microsoft.com/office/drawing/2014/main" id="{C409FD33-6233-7C49-9918-532E7EC05AB5}"/>
-              </a:ext>
-            </a:extLst>
-          </p:cNvPr>
-          <p:cNvSpPr>
-            <a:spLocks noGrp="1"/>
-          </p:cNvSpPr>
-          <p:nvPr>
-            <p:ph type="title"/>
-          </p:nvPr>
-        </p:nvSpPr>
-        <p:spPr>
-          <a:xfrm>
-            <a:off x="838200" y="2365324"/>
-            <a:ext cx="10515600" cy="2127352"/>
-          </a:xfrm>
-        </p:spPr>
-        <p:txBody>
-          <a:bodyPr>
-            <a:noAutofit/>
-          </a:bodyPr>
-          <a:lstStyle/>
-          <a:p>
-            <a:pPr algn="ctr"/>
-            <a:r>
-              <a:rPr lang="en-US" sz="6600" dirty="0"/>
-              <a:t>Bonus Technique: </a:t>
-            </a:r>
-            <a:br>
-              <a:rPr lang="en-US" sz="6600" dirty="0"/>
-            </a:br>
-            <a:r>
-              <a:rPr lang="en-US" sz="6600" dirty="0"/>
-              <a:t>Tracer Bullet/Steel Thread</a:t>
-            </a:r>
-          </a:p>
-        </p:txBody>
-      </p:sp>
-    </p:spTree>
-    <p:extLst>
-      <p:ext uri="{BB962C8B-B14F-4D97-AF65-F5344CB8AC3E}">
-        <p14:creationId xmlns:p14="http://schemas.microsoft.com/office/powerpoint/2010/main" val="3985096481"/>
-      </p:ext>
-    </p:extLst>
-  </p:cSld>
-  <p:clrMapOvr>
-    <a:masterClrMapping/>
-  </p:clrMapOvr>
-</p:sld>
-</file>
-
-<file path=ppt/slides/slide66.xml><?xml version="1.0" encoding="utf-8"?>
-<p:sld xmlns:a="http://schemas.openxmlformats.org/drawingml/2006/main" xmlns:r="http://schemas.openxmlformats.org/officeDocument/2006/relationships" xmlns:p="http://schemas.openxmlformats.org/presentationml/2006/main">
-  <p:cSld>
-    <p:bg>
-      <p:bgPr>
-        <a:solidFill>
           <a:schemeClr val="accent1"/>
         </a:solidFill>
         <a:effectLst/>
@@ -19175,7 +19004,7 @@
 </p:sld>
 </file>
 
-<file path=ppt/slides/slide67.xml><?xml version="1.0" encoding="utf-8"?>
+<file path=ppt/slides/slide66.xml><?xml version="1.0" encoding="utf-8"?>
 <p:sld xmlns:a="http://schemas.openxmlformats.org/drawingml/2006/main" xmlns:r="http://schemas.openxmlformats.org/officeDocument/2006/relationships" xmlns:p="http://schemas.openxmlformats.org/presentationml/2006/main">
   <p:cSld>
     <p:bg>

</xml_diff>

<commit_message>
Add sketchnote to title page
</commit_message>
<xml_diff>
--- a/comm-and-doc-arch-decisions-30-min.pptx
+++ b/comm-and-doc-arch-decisions-30-min.pptx
@@ -12035,7 +12035,12 @@
             <p:ph type="ctrTitle"/>
           </p:nvPr>
         </p:nvSpPr>
-        <p:spPr/>
+        <p:spPr>
+          <a:xfrm>
+            <a:off x="1524000" y="726521"/>
+            <a:ext cx="5461416" cy="2387600"/>
+          </a:xfrm>
+        </p:spPr>
         <p:txBody>
           <a:bodyPr>
             <a:normAutofit fontScale="90000"/>
@@ -12071,13 +12076,13 @@
         </p:nvSpPr>
         <p:spPr>
           <a:xfrm>
-            <a:off x="1524000" y="4937679"/>
-            <a:ext cx="9144000" cy="1655763"/>
+            <a:off x="1138290" y="3692011"/>
+            <a:ext cx="6221217" cy="2092708"/>
           </a:xfrm>
         </p:spPr>
         <p:txBody>
           <a:bodyPr>
-            <a:normAutofit lnSpcReduction="10000"/>
+            <a:normAutofit fontScale="92500" lnSpcReduction="20000"/>
           </a:bodyPr>
           <a:lstStyle/>
           <a:p>
@@ -12091,6 +12096,13 @@
             </a:r>
           </a:p>
           <a:p>
+            <a:endParaRPr lang="en-US" sz="3200" dirty="0">
+              <a:solidFill>
+                <a:schemeClr val="bg1"/>
+              </a:solidFill>
+            </a:endParaRPr>
+          </a:p>
+          <a:p>
             <a:r>
               <a:rPr lang="en-US" sz="3200" dirty="0" err="1">
                 <a:solidFill>
@@ -12138,7 +12150,7 @@
         </p:nvSpPr>
         <p:spPr>
           <a:xfrm>
-            <a:off x="1779373" y="4102443"/>
+            <a:off x="1524000" y="6362609"/>
             <a:ext cx="8699156" cy="461665"/>
           </a:xfrm>
           <a:prstGeom prst="rect">
@@ -12164,6 +12176,36 @@
           </a:p>
         </p:txBody>
       </p:sp>
+      <p:pic>
+        <p:nvPicPr>
+          <p:cNvPr id="6" name="Picture 5" descr="Text&#10;&#10;Description automatically generated">
+            <a:extLst>
+              <a:ext uri="{FF2B5EF4-FFF2-40B4-BE49-F238E27FC236}">
+                <a16:creationId xmlns:a16="http://schemas.microsoft.com/office/drawing/2014/main" id="{D8485CE6-D51E-3B83-A528-B937E528A825}"/>
+              </a:ext>
+            </a:extLst>
+          </p:cNvPr>
+          <p:cNvPicPr>
+            <a:picLocks noChangeAspect="1"/>
+          </p:cNvPicPr>
+          <p:nvPr/>
+        </p:nvPicPr>
+        <p:blipFill>
+          <a:blip r:embed="rId3"/>
+          <a:stretch>
+            <a:fillRect/>
+          </a:stretch>
+        </p:blipFill>
+        <p:spPr>
+          <a:xfrm>
+            <a:off x="7943102" y="298601"/>
+            <a:ext cx="4099295" cy="5870879"/>
+          </a:xfrm>
+          <a:prstGeom prst="rect">
+            <a:avLst/>
+          </a:prstGeom>
+        </p:spPr>
+      </p:pic>
     </p:spTree>
     <p:extLst>
       <p:ext uri="{BB962C8B-B14F-4D97-AF65-F5344CB8AC3E}">

</xml_diff>